<commit_message>
SBPM-680 some mistakes fixed
</commit_message>
<xml_diff>
--- a/Praesentationen/Futures und Routing.pptx
+++ b/Praesentationen/Futures und Routing.pptx
@@ -267,7 +267,7 @@
             <a:fld id="{A32DC80D-291A-4ABB-A78B-0417274A267C}" type="datetime4">
               <a:rPr lang="de-DE"/>
               <a:pPr/>
-              <a:t>13. August 2013</a:t>
+              <a:t>17. August 2013</a:t>
             </a:fld>
             <a:endParaRPr lang="de-DE"/>
           </a:p>
@@ -369,7 +369,7 @@
             <a:fld id="{C7CC2173-B0D1-45F1-9D54-E33B7353DA19}" type="slidenum">
               <a:rPr lang="de-DE"/>
               <a:pPr/>
-              <a:t>‹Nr.›</a:t>
+              <a:t>‹#›</a:t>
             </a:fld>
             <a:endParaRPr lang="de-DE"/>
           </a:p>
@@ -650,7 +650,7 @@
             <a:fld id="{065B079B-E513-489A-8A1B-D7C78493EA86}" type="datetime4">
               <a:rPr lang="de-DE"/>
               <a:pPr/>
-              <a:t>13. August 2013</a:t>
+              <a:t>17. August 2013</a:t>
             </a:fld>
             <a:endParaRPr lang="de-DE"/>
           </a:p>
@@ -859,7 +859,7 @@
             <a:fld id="{C36AA9A4-5D0B-4134-89A6-D8B9DAA4F25C}" type="slidenum">
               <a:rPr lang="de-DE"/>
               <a:pPr/>
-              <a:t>‹Nr.›</a:t>
+              <a:t>‹#›</a:t>
             </a:fld>
             <a:endParaRPr lang="de-DE"/>
           </a:p>
@@ -1583,7 +1583,7 @@
                 <a:tabLst/>
                 <a:defRPr/>
               </a:pPr>
-              <a:t>13.08.2013</a:t>
+              <a:t>17.08.2013</a:t>
             </a:fld>
             <a:r>
               <a:rPr kumimoji="0" lang="de-DE" sz="1000" b="0" i="0" u="none" strike="noStrike" kern="1200" cap="none" spc="0" normalizeH="0" baseline="0" noProof="0" dirty="0" smtClean="0">
@@ -1600,24 +1600,7 @@
                 <a:ea typeface="+mn-ea"/>
                 <a:cs typeface="Tahoma" pitchFamily="34" charset="0"/>
               </a:rPr>
-              <a:t>  </a:t>
-            </a:r>
-            <a:r>
-              <a:rPr kumimoji="0" lang="de-DE" sz="1000" b="0" i="0" u="none" strike="noStrike" kern="1200" cap="none" spc="0" normalizeH="0" baseline="0" noProof="0" dirty="0" smtClean="0">
-                <a:ln>
-                  <a:noFill/>
-                </a:ln>
-                <a:solidFill>
-                  <a:schemeClr val="tx1"/>
-                </a:solidFill>
-                <a:effectLst/>
-                <a:uLnTx/>
-                <a:uFillTx/>
-                <a:latin typeface="+mn-lt"/>
-                <a:ea typeface="+mn-ea"/>
-                <a:cs typeface="Tahoma" pitchFamily="34" charset="0"/>
-              </a:rPr>
-              <a:t>|  </a:t>
+              <a:t>  |  </a:t>
             </a:r>
             <a:fld id="{8E9B2640-8CD7-45FF-9440-54608BC46479}" type="slidenum">
               <a:rPr kumimoji="0" lang="de-DE" sz="1000" b="0" i="0" u="none" strike="noStrike" kern="1200" cap="none" spc="0" normalizeH="0" baseline="0" noProof="0" smtClean="0">
@@ -1651,7 +1634,7 @@
                 <a:tabLst/>
                 <a:defRPr/>
               </a:pPr>
-              <a:t>‹Nr.›</a:t>
+              <a:t>‹#›</a:t>
             </a:fld>
             <a:endParaRPr kumimoji="0" lang="de-DE" sz="1000" b="0" i="0" u="none" strike="noStrike" kern="1200" cap="none" spc="0" normalizeH="0" baseline="0" noProof="0" dirty="0" smtClean="0">
               <a:ln>
@@ -3049,7 +3032,7 @@
                 <a:tabLst/>
                 <a:defRPr/>
               </a:pPr>
-              <a:t>13.08.2013</a:t>
+              <a:t>17.08.2013</a:t>
             </a:fld>
             <a:r>
               <a:rPr kumimoji="0" lang="de-DE" sz="1000" b="0" i="0" u="none" strike="noStrike" kern="1200" cap="none" spc="0" normalizeH="0" baseline="0" noProof="0" dirty="0" smtClean="0">
@@ -3066,24 +3049,7 @@
                 <a:ea typeface="+mn-ea"/>
                 <a:cs typeface="Tahoma" pitchFamily="34" charset="0"/>
               </a:rPr>
-              <a:t>  </a:t>
-            </a:r>
-            <a:r>
-              <a:rPr kumimoji="0" lang="de-DE" sz="1000" b="0" i="0" u="none" strike="noStrike" kern="1200" cap="none" spc="0" normalizeH="0" baseline="0" noProof="0" dirty="0" smtClean="0">
-                <a:ln>
-                  <a:noFill/>
-                </a:ln>
-                <a:solidFill>
-                  <a:schemeClr val="tx1"/>
-                </a:solidFill>
-                <a:effectLst/>
-                <a:uLnTx/>
-                <a:uFillTx/>
-                <a:latin typeface="+mn-lt"/>
-                <a:ea typeface="+mn-ea"/>
-                <a:cs typeface="Tahoma" pitchFamily="34" charset="0"/>
-              </a:rPr>
-              <a:t>|  </a:t>
+              <a:t>  |  </a:t>
             </a:r>
             <a:fld id="{8E9B2640-8CD7-45FF-9440-54608BC46479}" type="slidenum">
               <a:rPr kumimoji="0" lang="de-DE" sz="1000" b="0" i="0" u="none" strike="noStrike" kern="1200" cap="none" spc="0" normalizeH="0" baseline="0" noProof="0" smtClean="0">
@@ -3117,7 +3083,7 @@
                 <a:tabLst/>
                 <a:defRPr/>
               </a:pPr>
-              <a:t>‹Nr.›</a:t>
+              <a:t>‹#›</a:t>
             </a:fld>
             <a:endParaRPr kumimoji="0" lang="de-DE" sz="1000" b="0" i="0" u="none" strike="noStrike" kern="1200" cap="none" spc="0" normalizeH="0" baseline="0" noProof="0" dirty="0" smtClean="0">
               <a:ln>
@@ -3643,6 +3609,41 @@
           </a:p>
         </p:txBody>
       </p:sp>
+      <p:sp>
+        <p:nvSpPr>
+          <p:cNvPr id="4" name="TextBox 3"/>
+          <p:cNvSpPr txBox="1"/>
+          <p:nvPr/>
+        </p:nvSpPr>
+        <p:spPr>
+          <a:xfrm>
+            <a:off x="5165881" y="5974541"/>
+            <a:ext cx="3672408" cy="338554"/>
+          </a:xfrm>
+          <a:prstGeom prst="rect">
+            <a:avLst/>
+          </a:prstGeom>
+          <a:noFill/>
+        </p:spPr>
+        <p:txBody>
+          <a:bodyPr wrap="square" rtlCol="0">
+            <a:spAutoFit/>
+          </a:bodyPr>
+          <a:lstStyle/>
+          <a:p>
+            <a:pPr algn="r"/>
+            <a:r>
+              <a:rPr lang="de-DE" sz="1600" dirty="0"/>
+              <a:t>Matthias </a:t>
+            </a:r>
+            <a:r>
+              <a:rPr lang="de-DE" sz="1600" dirty="0" smtClean="0"/>
+              <a:t>Jahn, Frederick Schäfer</a:t>
+            </a:r>
+            <a:endParaRPr lang="de-DE" sz="1600" dirty="0"/>
+          </a:p>
+        </p:txBody>
+      </p:sp>
     </p:spTree>
   </p:cSld>
   <p:clrMapOvr>
@@ -3925,11 +3926,7 @@
             </a:r>
             <a:r>
               <a:rPr lang="de-DE" dirty="0" smtClean="0"/>
-              <a:t> </a:t>
-            </a:r>
-            <a:r>
-              <a:rPr lang="de-DE" dirty="0" smtClean="0"/>
-              <a:t>Comprehension</a:t>
+              <a:t> Comprehension</a:t>
             </a:r>
             <a:endParaRPr lang="de-DE" dirty="0"/>
           </a:p>
@@ -4040,8 +4037,10 @@
                 <a:latin typeface="Consolas" pitchFamily="49" charset="0"/>
                 <a:cs typeface="Consolas" pitchFamily="49" charset="0"/>
               </a:rPr>
-              <a:t>  a =&gt; futureB map { b =&gt; a * b </a:t>
-            </a:r>
+              <a:t>  a =&gt; futureB map { b =&gt; a * b }</a:t>
+            </a:r>
+          </a:p>
+          <a:p>
             <a:r>
               <a:rPr lang="de-DE" sz="1600" dirty="0" smtClean="0">
                 <a:latin typeface="Consolas" pitchFamily="49" charset="0"/>
@@ -4049,19 +4048,6 @@
               </a:rPr>
               <a:t>}</a:t>
             </a:r>
-          </a:p>
-          <a:p>
-            <a:r>
-              <a:rPr lang="de-DE" sz="1600" dirty="0" smtClean="0">
-                <a:latin typeface="Consolas" pitchFamily="49" charset="0"/>
-                <a:cs typeface="Consolas" pitchFamily="49" charset="0"/>
-              </a:rPr>
-              <a:t>}</a:t>
-            </a:r>
-            <a:endParaRPr lang="de-DE" sz="1600" dirty="0" smtClean="0">
-              <a:latin typeface="Consolas" pitchFamily="49" charset="0"/>
-              <a:cs typeface="Consolas" pitchFamily="49" charset="0"/>
-            </a:endParaRPr>
           </a:p>
         </p:txBody>
       </p:sp>
@@ -4214,7 +4200,7 @@
         <p:spPr>
           <a:xfrm>
             <a:off x="4970190" y="4218369"/>
-            <a:ext cx="2753927" cy="1077218"/>
+            <a:ext cx="3490242" cy="1077218"/>
           </a:xfrm>
           <a:prstGeom prst="rect">
             <a:avLst/>
@@ -4255,32 +4241,53 @@
                 <a:latin typeface="Consolas" pitchFamily="49" charset="0"/>
                 <a:cs typeface="Consolas" pitchFamily="49" charset="0"/>
               </a:rPr>
-              <a:t> a &lt;- calcA()</a:t>
-            </a:r>
-          </a:p>
-          <a:p>
+              <a:t> a &lt;- </a:t>
+            </a:r>
             <a:r>
               <a:rPr lang="de-DE" sz="1600" dirty="0">
                 <a:latin typeface="Consolas" pitchFamily="49" charset="0"/>
                 <a:cs typeface="Consolas" pitchFamily="49" charset="0"/>
               </a:rPr>
-              <a:t> </a:t>
-            </a:r>
+              <a:t>Future { calcA() }</a:t>
+            </a:r>
+          </a:p>
+          <a:p>
             <a:r>
               <a:rPr lang="de-DE" sz="1600" dirty="0" smtClean="0">
                 <a:latin typeface="Consolas" pitchFamily="49" charset="0"/>
                 <a:cs typeface="Consolas" pitchFamily="49" charset="0"/>
               </a:rPr>
-              <a:t> b &lt;- calcB()</a:t>
-            </a:r>
-          </a:p>
-          <a:p>
+              <a:t>  </a:t>
+            </a:r>
             <a:r>
               <a:rPr lang="de-DE" sz="1600" dirty="0" smtClean="0">
                 <a:latin typeface="Consolas" pitchFamily="49" charset="0"/>
                 <a:cs typeface="Consolas" pitchFamily="49" charset="0"/>
               </a:rPr>
-              <a:t>) yield a * b</a:t>
+              <a:t>b &lt;- </a:t>
+            </a:r>
+            <a:r>
+              <a:rPr lang="de-DE" sz="1600" dirty="0">
+                <a:latin typeface="Consolas" pitchFamily="49" charset="0"/>
+                <a:cs typeface="Consolas" pitchFamily="49" charset="0"/>
+              </a:rPr>
+              <a:t>Future { calcB() }</a:t>
+            </a:r>
+          </a:p>
+          <a:p>
+            <a:r>
+              <a:rPr lang="de-DE" sz="1600" dirty="0" smtClean="0">
+                <a:latin typeface="Consolas" pitchFamily="49" charset="0"/>
+                <a:cs typeface="Consolas" pitchFamily="49" charset="0"/>
+              </a:rPr>
+              <a:t>) </a:t>
+            </a:r>
+            <a:r>
+              <a:rPr lang="de-DE" sz="1600" dirty="0" smtClean="0">
+                <a:latin typeface="Consolas" pitchFamily="49" charset="0"/>
+                <a:cs typeface="Consolas" pitchFamily="49" charset="0"/>
+              </a:rPr>
+              <a:t>yield a * b</a:t>
             </a:r>
             <a:endParaRPr lang="de-DE" sz="1600" dirty="0">
               <a:latin typeface="Consolas" pitchFamily="49" charset="0"/>
@@ -4451,11 +4458,7 @@
             </a:pPr>
             <a:r>
               <a:rPr lang="de-DE" dirty="0" smtClean="0"/>
-              <a:t>Kapselung des </a:t>
-            </a:r>
-            <a:r>
-              <a:rPr lang="de-DE" dirty="0" smtClean="0"/>
-              <a:t>internen </a:t>
+              <a:t>Kapselung des internen </a:t>
             </a:r>
             <a:r>
               <a:rPr lang="de-DE" dirty="0" err="1" smtClean="0"/>
@@ -4463,11 +4466,7 @@
             </a:r>
             <a:r>
               <a:rPr lang="de-DE" dirty="0" smtClean="0"/>
-              <a:t> </a:t>
-            </a:r>
-            <a:r>
-              <a:rPr lang="de-DE" dirty="0" smtClean="0"/>
-              <a:t>beachten</a:t>
+              <a:t> beachten</a:t>
             </a:r>
           </a:p>
           <a:p>
@@ -4497,11 +4496,7 @@
             </a:r>
             <a:r>
               <a:rPr lang="de-DE" dirty="0" smtClean="0"/>
-              <a:t> </a:t>
-            </a:r>
-            <a:r>
-              <a:rPr lang="de-DE" dirty="0" smtClean="0"/>
-              <a:t>ist ein </a:t>
+              <a:t> ist ein </a:t>
             </a:r>
             <a:r>
               <a:rPr lang="de-DE" i="1" dirty="0" err="1" smtClean="0"/>
@@ -4688,15 +4683,7 @@
             </a:pPr>
             <a:r>
               <a:rPr lang="de-DE" dirty="0" smtClean="0"/>
-              <a:t>seit Version </a:t>
-            </a:r>
-            <a:r>
-              <a:rPr lang="de-DE" dirty="0" smtClean="0"/>
-              <a:t>1.2-M8 </a:t>
-            </a:r>
-            <a:r>
-              <a:rPr lang="de-DE" dirty="0" smtClean="0"/>
-              <a:t>zusätzlich mit onSuccess, onFailure und onComplete Direktiven</a:t>
+              <a:t>seit Version 1.2-M8 zusätzlich mit onSuccess, onFailure und onComplete Direktiven</a:t>
             </a:r>
             <a:endParaRPr lang="de-DE" dirty="0"/>
           </a:p>
@@ -5737,11 +5724,7 @@
           <a:p>
             <a:r>
               <a:rPr lang="de-DE" dirty="0" smtClean="0"/>
-              <a:t>Anweisungen </a:t>
-            </a:r>
-            <a:r>
-              <a:rPr lang="de-DE" dirty="0" smtClean="0"/>
-              <a:t>innerhalb des Routingpfades</a:t>
+              <a:t>Anweisungen innerhalb des Routingpfades</a:t>
             </a:r>
             <a:endParaRPr lang="de-DE" dirty="0"/>
           </a:p>
@@ -5755,7 +5738,7 @@
         </p:nvSpPr>
         <p:spPr>
           <a:xfrm>
-            <a:off x="467544" y="2887489"/>
+            <a:off x="467544" y="2602472"/>
             <a:ext cx="7165553" cy="1077218"/>
           </a:xfrm>
           <a:prstGeom prst="rect">
@@ -5909,7 +5892,7 @@
         </p:nvSpPr>
         <p:spPr>
           <a:xfrm>
-            <a:off x="467544" y="4096394"/>
+            <a:off x="500031" y="3727062"/>
             <a:ext cx="5256584" cy="369332"/>
           </a:xfrm>
           <a:prstGeom prst="rect">
@@ -5943,7 +5926,7 @@
         </p:nvSpPr>
         <p:spPr>
           <a:xfrm>
-            <a:off x="467544" y="4487792"/>
+            <a:off x="500031" y="4118460"/>
             <a:ext cx="6912768" cy="1815882"/>
           </a:xfrm>
           <a:prstGeom prst="rect">
@@ -6218,7 +6201,7 @@
         </p:nvSpPr>
         <p:spPr>
           <a:xfrm>
-            <a:off x="5004048" y="4281060"/>
+            <a:off x="5036535" y="3911728"/>
             <a:ext cx="3061097" cy="720080"/>
           </a:xfrm>
           <a:prstGeom prst="borderCallout1">
@@ -6294,6 +6277,35 @@
               <a:buChar char="-"/>
             </a:pPr>
             <a:endParaRPr lang="de-DE" dirty="0"/>
+          </a:p>
+        </p:txBody>
+      </p:sp>
+      <p:sp>
+        <p:nvSpPr>
+          <p:cNvPr id="4" name="TextBox 3"/>
+          <p:cNvSpPr txBox="1"/>
+          <p:nvPr/>
+        </p:nvSpPr>
+        <p:spPr>
+          <a:xfrm>
+            <a:off x="467544" y="6036734"/>
+            <a:ext cx="5620449" cy="246221"/>
+          </a:xfrm>
+          <a:prstGeom prst="rect">
+            <a:avLst/>
+          </a:prstGeom>
+          <a:noFill/>
+        </p:spPr>
+        <p:txBody>
+          <a:bodyPr wrap="none" rtlCol="0">
+            <a:spAutoFit/>
+          </a:bodyPr>
+          <a:lstStyle/>
+          <a:p>
+            <a:r>
+              <a:rPr lang="de-DE" sz="1000" dirty="0"/>
+              <a:t>http://spray.io/documentation/1.2-M8/spray-routing/advanced-topics/understanding-dsl-structure/</a:t>
+            </a:r>
           </a:p>
         </p:txBody>
       </p:sp>
@@ -6424,56 +6436,35 @@
                 <a:latin typeface="Consolas" pitchFamily="49" charset="0"/>
                 <a:cs typeface="Consolas" pitchFamily="49" charset="0"/>
               </a:rPr>
-              <a:t>   </a:t>
+              <a:t>   "</a:t>
+            </a:r>
+            <a:r>
+              <a:rPr lang="de-DE" sz="1600" dirty="0" err="1" smtClean="0">
+                <a:latin typeface="Consolas" pitchFamily="49" charset="0"/>
+                <a:cs typeface="Consolas" pitchFamily="49" charset="0"/>
+              </a:rPr>
+              <a:t>Current</a:t>
             </a:r>
             <a:r>
               <a:rPr lang="de-DE" sz="1600" dirty="0" smtClean="0">
                 <a:latin typeface="Consolas" pitchFamily="49" charset="0"/>
                 <a:cs typeface="Consolas" pitchFamily="49" charset="0"/>
               </a:rPr>
-              <a:t>"</a:t>
-            </a:r>
-            <a:r>
-              <a:rPr lang="de-DE" sz="1600" dirty="0" err="1" smtClean="0">
-                <a:latin typeface="Consolas" pitchFamily="49" charset="0"/>
-                <a:cs typeface="Consolas" pitchFamily="49" charset="0"/>
-              </a:rPr>
-              <a:t>Current</a:t>
+              <a:t> </a:t>
+            </a:r>
+            <a:r>
+              <a:rPr lang="de-DE" sz="1600" dirty="0">
+                <a:latin typeface="Consolas" pitchFamily="49" charset="0"/>
+                <a:cs typeface="Consolas" pitchFamily="49" charset="0"/>
+              </a:rPr>
+              <a:t>time: "</a:t>
             </a:r>
             <a:r>
               <a:rPr lang="de-DE" sz="1600" dirty="0" smtClean="0">
                 <a:latin typeface="Consolas" pitchFamily="49" charset="0"/>
                 <a:cs typeface="Consolas" pitchFamily="49" charset="0"/>
               </a:rPr>
-              <a:t> </a:t>
-            </a:r>
-            <a:r>
-              <a:rPr lang="de-DE" sz="1600" dirty="0">
-                <a:latin typeface="Consolas" pitchFamily="49" charset="0"/>
-                <a:cs typeface="Consolas" pitchFamily="49" charset="0"/>
-              </a:rPr>
-              <a:t>time: </a:t>
-            </a:r>
-            <a:r>
-              <a:rPr lang="de-DE" sz="1600" dirty="0">
-                <a:latin typeface="Consolas" pitchFamily="49" charset="0"/>
-                <a:cs typeface="Consolas" pitchFamily="49" charset="0"/>
-              </a:rPr>
-              <a:t>"</a:t>
-            </a:r>
-            <a:r>
-              <a:rPr lang="de-DE" sz="1600" dirty="0" smtClean="0">
-                <a:latin typeface="Consolas" pitchFamily="49" charset="0"/>
-                <a:cs typeface="Consolas" pitchFamily="49" charset="0"/>
-              </a:rPr>
-              <a:t> </a:t>
-            </a:r>
-            <a:r>
-              <a:rPr lang="de-DE" sz="1600" dirty="0" smtClean="0">
-                <a:latin typeface="Consolas" pitchFamily="49" charset="0"/>
-                <a:cs typeface="Consolas" pitchFamily="49" charset="0"/>
-              </a:rPr>
-              <a:t>+ time</a:t>
+              <a:t> + time</a:t>
             </a:r>
           </a:p>
           <a:p>
@@ -6638,14 +6629,7 @@
                 <a:latin typeface="Consolas" pitchFamily="49" charset="0"/>
                 <a:cs typeface="Consolas" pitchFamily="49" charset="0"/>
               </a:rPr>
-              <a:t>" + time</a:t>
-            </a:r>
-            <a:r>
-              <a:rPr lang="de-DE" sz="1600" dirty="0" smtClean="0">
-                <a:latin typeface="Consolas" pitchFamily="49" charset="0"/>
-                <a:cs typeface="Consolas" pitchFamily="49" charset="0"/>
-              </a:rPr>
-              <a:t>)</a:t>
+              <a:t>" + time)</a:t>
             </a:r>
           </a:p>
           <a:p>

</xml_diff>